<commit_message>
tweaked image, change hyperref settings
</commit_message>
<xml_diff>
--- a/doc/figures.pptx
+++ b/doc/figures.pptx
@@ -1546,6 +1546,13 @@
         </dgm:presLayoutVars>
       </dgm:prSet>
       <dgm:spPr/>
+      <dgm:t>
+        <a:bodyPr/>
+        <a:lstStyle/>
+        <a:p>
+          <a:endParaRPr lang="en-US"/>
+        </a:p>
+      </dgm:t>
     </dgm:pt>
     <dgm:pt modelId="{6D8694A4-D71E-44F2-BD6A-B7C8E2C7DFA8}" type="pres">
       <dgm:prSet presAssocID="{D9448254-AE8E-4635-ACBF-DB9B925BD872}" presName="tSp" presStyleCnt="0"/>
@@ -1605,6 +1612,13 @@
         </dgm:presLayoutVars>
       </dgm:prSet>
       <dgm:spPr/>
+      <dgm:t>
+        <a:bodyPr/>
+        <a:lstStyle/>
+        <a:p>
+          <a:endParaRPr lang="en-US"/>
+        </a:p>
+      </dgm:t>
     </dgm:pt>
     <dgm:pt modelId="{67ADBF5F-4786-4791-8299-F523B4CCA4B6}" type="pres">
       <dgm:prSet presAssocID="{E721CA90-159E-4B4A-B347-490CB2DC1862}" presName="connSite1" presStyleCnt="0"/>
@@ -1613,6 +1627,13 @@
     <dgm:pt modelId="{171AAD30-C5AB-410D-B5A8-462655FF6DFF}" type="pres">
       <dgm:prSet presAssocID="{ED5DADED-FCE7-41F0-9C45-5058318452B8}" presName="Name9" presStyleLbl="sibTrans2D1" presStyleIdx="0" presStyleCnt="3"/>
       <dgm:spPr/>
+      <dgm:t>
+        <a:bodyPr/>
+        <a:lstStyle/>
+        <a:p>
+          <a:endParaRPr lang="en-US"/>
+        </a:p>
+      </dgm:t>
     </dgm:pt>
     <dgm:pt modelId="{CF281FD0-16BC-4230-83C9-79D67F24F86D}" type="pres">
       <dgm:prSet presAssocID="{D405BF79-7C82-407C-97C9-D37648AE0C80}" presName="composite2" presStyleCnt="0"/>
@@ -1660,6 +1681,13 @@
         </dgm:presLayoutVars>
       </dgm:prSet>
       <dgm:spPr/>
+      <dgm:t>
+        <a:bodyPr/>
+        <a:lstStyle/>
+        <a:p>
+          <a:endParaRPr lang="en-US"/>
+        </a:p>
+      </dgm:t>
     </dgm:pt>
     <dgm:pt modelId="{40010249-5985-4AE9-95FF-D25433AD81B9}" type="pres">
       <dgm:prSet presAssocID="{D405BF79-7C82-407C-97C9-D37648AE0C80}" presName="connSite2" presStyleCnt="0"/>
@@ -1668,6 +1696,13 @@
     <dgm:pt modelId="{0ABFA79C-E942-4F49-842A-F027FDA9C099}" type="pres">
       <dgm:prSet presAssocID="{BBEC2269-E1E3-4B64-BA72-94489A579225}" presName="Name18" presStyleLbl="sibTrans2D1" presStyleIdx="1" presStyleCnt="3"/>
       <dgm:spPr/>
+      <dgm:t>
+        <a:bodyPr/>
+        <a:lstStyle/>
+        <a:p>
+          <a:endParaRPr lang="en-US"/>
+        </a:p>
+      </dgm:t>
     </dgm:pt>
     <dgm:pt modelId="{3C1BDAB7-DC41-432F-B8F8-754076DD6F3B}" type="pres">
       <dgm:prSet presAssocID="{59DF42FF-C34D-4C87-87F3-214AE2998D04}" presName="composite1" presStyleCnt="0"/>
@@ -1715,6 +1750,13 @@
         </dgm:presLayoutVars>
       </dgm:prSet>
       <dgm:spPr/>
+      <dgm:t>
+        <a:bodyPr/>
+        <a:lstStyle/>
+        <a:p>
+          <a:endParaRPr lang="en-US"/>
+        </a:p>
+      </dgm:t>
     </dgm:pt>
     <dgm:pt modelId="{FE62A57E-8851-48FF-A93E-9D2676AFD42A}" type="pres">
       <dgm:prSet presAssocID="{59DF42FF-C34D-4C87-87F3-214AE2998D04}" presName="connSite1" presStyleCnt="0"/>
@@ -1723,6 +1765,13 @@
     <dgm:pt modelId="{61061CD2-5FA5-4B24-9A42-33BBE6630A46}" type="pres">
       <dgm:prSet presAssocID="{F0999A7E-BAC8-4E85-9C92-F8616342925D}" presName="Name9" presStyleLbl="sibTrans2D1" presStyleIdx="2" presStyleCnt="3"/>
       <dgm:spPr/>
+      <dgm:t>
+        <a:bodyPr/>
+        <a:lstStyle/>
+        <a:p>
+          <a:endParaRPr lang="en-US"/>
+        </a:p>
+      </dgm:t>
     </dgm:pt>
     <dgm:pt modelId="{0F53DD20-B617-4A80-B50E-E5783DF3F900}" type="pres">
       <dgm:prSet presAssocID="{A9104333-25D5-4A30-8438-4885D4EE302A}" presName="composite2" presStyleCnt="0"/>
@@ -1739,6 +1788,13 @@
         </dgm:presLayoutVars>
       </dgm:prSet>
       <dgm:spPr/>
+      <dgm:t>
+        <a:bodyPr/>
+        <a:lstStyle/>
+        <a:p>
+          <a:endParaRPr lang="en-US"/>
+        </a:p>
+      </dgm:t>
     </dgm:pt>
     <dgm:pt modelId="{16EBD39F-FBF6-41A9-8154-02526BCECBD6}" type="pres">
       <dgm:prSet presAssocID="{A9104333-25D5-4A30-8438-4885D4EE302A}" presName="childNode2tx" presStyleLbl="bgAcc1" presStyleIdx="3" presStyleCnt="4">
@@ -1747,6 +1803,13 @@
         </dgm:presLayoutVars>
       </dgm:prSet>
       <dgm:spPr/>
+      <dgm:t>
+        <a:bodyPr/>
+        <a:lstStyle/>
+        <a:p>
+          <a:endParaRPr lang="en-US"/>
+        </a:p>
+      </dgm:t>
     </dgm:pt>
     <dgm:pt modelId="{19F24AEE-DAFE-440C-A732-9E1AA2CABE12}" type="pres">
       <dgm:prSet presAssocID="{A9104333-25D5-4A30-8438-4885D4EE302A}" presName="parentNode2" presStyleLbl="node1" presStyleIdx="3" presStyleCnt="4">
@@ -1756,6 +1819,13 @@
         </dgm:presLayoutVars>
       </dgm:prSet>
       <dgm:spPr/>
+      <dgm:t>
+        <a:bodyPr/>
+        <a:lstStyle/>
+        <a:p>
+          <a:endParaRPr lang="en-US"/>
+        </a:p>
+      </dgm:t>
     </dgm:pt>
     <dgm:pt modelId="{A0C4A62A-AEC7-4F91-A139-7ECBD3E83CCB}" type="pres">
       <dgm:prSet presAssocID="{A9104333-25D5-4A30-8438-4885D4EE302A}" presName="connSite2" presStyleCnt="0"/>
@@ -1763,45 +1833,45 @@
     </dgm:pt>
   </dgm:ptLst>
   <dgm:cxnLst>
-    <dgm:cxn modelId="{55714F80-1D47-455D-90E3-0F19CDEEB48C}" srcId="{A9104333-25D5-4A30-8438-4885D4EE302A}" destId="{59771C6B-15BC-4FDA-8C1E-47717B3D8850}" srcOrd="1" destOrd="0" parTransId="{A4CE76F5-B6A1-4365-8991-75054459C8D1}" sibTransId="{DACC9DED-6447-489B-B681-604ACB142661}"/>
-    <dgm:cxn modelId="{DAA65F9F-5F68-433D-A11E-299BC5A3CF4A}" type="presOf" srcId="{F0999A7E-BAC8-4E85-9C92-F8616342925D}" destId="{61061CD2-5FA5-4B24-9A42-33BBE6630A46}" srcOrd="0" destOrd="0" presId="urn:microsoft.com/office/officeart/2005/8/layout/hProcess4"/>
-    <dgm:cxn modelId="{8B06B3BD-09E9-4E90-A362-18BD3B22904C}" type="presOf" srcId="{BEB6383D-5F48-49AD-B003-39327DC52895}" destId="{3608ADFF-D305-4AE1-A57C-BD6A4A179305}" srcOrd="0" destOrd="1" presId="urn:microsoft.com/office/officeart/2005/8/layout/hProcess4"/>
+    <dgm:cxn modelId="{3AC423FE-2150-4446-99C4-B35791D32D0F}" type="presOf" srcId="{BEB6383D-5F48-49AD-B003-39327DC52895}" destId="{1A69946C-9782-4DCB-9715-C9A8A667F0C8}" srcOrd="1" destOrd="1" presId="urn:microsoft.com/office/officeart/2005/8/layout/hProcess4"/>
+    <dgm:cxn modelId="{311C9220-82F1-4FB0-8E39-B984E72FA225}" type="presOf" srcId="{BBEC2269-E1E3-4B64-BA72-94489A579225}" destId="{0ABFA79C-E942-4F49-842A-F027FDA9C099}" srcOrd="0" destOrd="0" presId="urn:microsoft.com/office/officeart/2005/8/layout/hProcess4"/>
+    <dgm:cxn modelId="{BAB62512-8276-4A88-B215-1F9C1E65D9A1}" type="presOf" srcId="{59771C6B-15BC-4FDA-8C1E-47717B3D8850}" destId="{534BA637-795B-4791-BEB5-E2BE6EDE78FC}" srcOrd="0" destOrd="1" presId="urn:microsoft.com/office/officeart/2005/8/layout/hProcess4"/>
+    <dgm:cxn modelId="{3E1A3788-63C1-47F8-94E0-878495A8D31B}" srcId="{D9448254-AE8E-4635-ACBF-DB9B925BD872}" destId="{59DF42FF-C34D-4C87-87F3-214AE2998D04}" srcOrd="2" destOrd="0" parTransId="{B368E38A-939D-4EDC-8B11-4E8C490045AE}" sibTransId="{F0999A7E-BAC8-4E85-9C92-F8616342925D}"/>
     <dgm:cxn modelId="{5016F23D-E203-42AE-9922-DFCA7533376A}" type="presOf" srcId="{F36801D7-49D8-49A5-AD5D-B220567AA634}" destId="{DA4C706D-A65C-46F4-B122-A54047B3C548}" srcOrd="1" destOrd="0" presId="urn:microsoft.com/office/officeart/2005/8/layout/hProcess4"/>
     <dgm:cxn modelId="{1F0EDD5C-3C16-4EF3-B94C-E6A7F2708166}" type="presOf" srcId="{B4F202BB-15DF-4DAF-BF4F-71FD522BE12A}" destId="{534BA637-795B-4791-BEB5-E2BE6EDE78FC}" srcOrd="0" destOrd="0" presId="urn:microsoft.com/office/officeart/2005/8/layout/hProcess4"/>
-    <dgm:cxn modelId="{E82BA64F-4DA1-4C14-80E7-466DAB9D0F16}" srcId="{59DF42FF-C34D-4C87-87F3-214AE2998D04}" destId="{F36801D7-49D8-49A5-AD5D-B220567AA634}" srcOrd="0" destOrd="0" parTransId="{674E1BA2-291C-461B-B48E-E989FA229107}" sibTransId="{B57876D5-5A58-4E42-824C-480133EF53C2}"/>
-    <dgm:cxn modelId="{3AC423FE-2150-4446-99C4-B35791D32D0F}" type="presOf" srcId="{BEB6383D-5F48-49AD-B003-39327DC52895}" destId="{1A69946C-9782-4DCB-9715-C9A8A667F0C8}" srcOrd="1" destOrd="1" presId="urn:microsoft.com/office/officeart/2005/8/layout/hProcess4"/>
-    <dgm:cxn modelId="{96A59A65-382C-45CB-A807-9F0F7CA64FDF}" srcId="{59DF42FF-C34D-4C87-87F3-214AE2998D04}" destId="{7D411061-EEE6-4DCD-869C-9209B86CCEEB}" srcOrd="1" destOrd="0" parTransId="{85C806DC-1C24-4A25-9241-32B338A6164F}" sibTransId="{D9418011-AFB8-49AA-98EA-41667369FC43}"/>
-    <dgm:cxn modelId="{D1CCAB09-E99F-41E1-A38D-162377E34A70}" type="presOf" srcId="{59DF42FF-C34D-4C87-87F3-214AE2998D04}" destId="{FA54A26A-9135-4542-A3F7-B0BAE1B9A780}" srcOrd="0" destOrd="0" presId="urn:microsoft.com/office/officeart/2005/8/layout/hProcess4"/>
-    <dgm:cxn modelId="{D9E9E711-0110-4BA1-ABB8-22216166BDF3}" type="presOf" srcId="{A29A9B2B-3F7A-44C1-8093-582337A07BC9}" destId="{3608ADFF-D305-4AE1-A57C-BD6A4A179305}" srcOrd="0" destOrd="2" presId="urn:microsoft.com/office/officeart/2005/8/layout/hProcess4"/>
-    <dgm:cxn modelId="{00BAC469-EFB5-4A53-B249-6848487EDA2F}" type="presOf" srcId="{E721CA90-159E-4B4A-B347-490CB2DC1862}" destId="{D521EA5A-F59F-44EC-A133-47DD90FA89B7}" srcOrd="0" destOrd="0" presId="urn:microsoft.com/office/officeart/2005/8/layout/hProcess4"/>
-    <dgm:cxn modelId="{38FBDF52-BFEC-4AA1-8D3F-1359CCC9ED62}" type="presOf" srcId="{7D411061-EEE6-4DCD-869C-9209B86CCEEB}" destId="{DA4C706D-A65C-46F4-B122-A54047B3C548}" srcOrd="1" destOrd="1" presId="urn:microsoft.com/office/officeart/2005/8/layout/hProcess4"/>
-    <dgm:cxn modelId="{1914AE6C-974B-43A9-9B9E-B3F91224977A}" type="presOf" srcId="{A29A9B2B-3F7A-44C1-8093-582337A07BC9}" destId="{1A69946C-9782-4DCB-9715-C9A8A667F0C8}" srcOrd="1" destOrd="2" presId="urn:microsoft.com/office/officeart/2005/8/layout/hProcess4"/>
-    <dgm:cxn modelId="{618CE966-1FCB-408D-B41C-BEFFE7EC4AC7}" type="presOf" srcId="{8011DAE7-E5E4-47CD-AD66-8B24BF36AF9D}" destId="{7BFE43BA-8D4E-4911-B0C3-823734CD8334}" srcOrd="0" destOrd="1" presId="urn:microsoft.com/office/officeart/2005/8/layout/hProcess4"/>
-    <dgm:cxn modelId="{311C9220-82F1-4FB0-8E39-B984E72FA225}" type="presOf" srcId="{BBEC2269-E1E3-4B64-BA72-94489A579225}" destId="{0ABFA79C-E942-4F49-842A-F027FDA9C099}" srcOrd="0" destOrd="0" presId="urn:microsoft.com/office/officeart/2005/8/layout/hProcess4"/>
-    <dgm:cxn modelId="{9FAB019F-6D17-4419-BC7A-2FEC299A9391}" type="presOf" srcId="{7D411061-EEE6-4DCD-869C-9209B86CCEEB}" destId="{5D485618-4DD7-47D9-A0A9-4AEC986B5F6B}" srcOrd="0" destOrd="1" presId="urn:microsoft.com/office/officeart/2005/8/layout/hProcess4"/>
-    <dgm:cxn modelId="{7C6B9E94-7289-4107-8CEA-8FAB56397C26}" type="presOf" srcId="{2E6ACB87-0757-43C9-9C57-AA060AD27EC7}" destId="{7BFE43BA-8D4E-4911-B0C3-823734CD8334}" srcOrd="0" destOrd="0" presId="urn:microsoft.com/office/officeart/2005/8/layout/hProcess4"/>
-    <dgm:cxn modelId="{B73DB81D-70AF-4270-9B6A-240AB9810C94}" type="presOf" srcId="{D18D074B-6165-4000-96EF-CC84856597B6}" destId="{3608ADFF-D305-4AE1-A57C-BD6A4A179305}" srcOrd="0" destOrd="0" presId="urn:microsoft.com/office/officeart/2005/8/layout/hProcess4"/>
-    <dgm:cxn modelId="{C5C70189-3FF3-4F60-8DE1-B6E8113E6768}" srcId="{E721CA90-159E-4B4A-B347-490CB2DC1862}" destId="{D18D074B-6165-4000-96EF-CC84856597B6}" srcOrd="0" destOrd="0" parTransId="{46747984-3136-4FF1-942B-B28EA8413042}" sibTransId="{CCC01226-4C26-4DD8-9FB2-9E72FE4059A3}"/>
-    <dgm:cxn modelId="{DBF1C19E-020D-4205-9606-ECA620F1C6CF}" type="presOf" srcId="{8011DAE7-E5E4-47CD-AD66-8B24BF36AF9D}" destId="{A807385D-E159-4AD1-B2F0-6D10566E3A0C}" srcOrd="1" destOrd="1" presId="urn:microsoft.com/office/officeart/2005/8/layout/hProcess4"/>
-    <dgm:cxn modelId="{4CC355DE-2BF8-4DBD-9FFF-6FD763B9C7EF}" type="presOf" srcId="{D9448254-AE8E-4635-ACBF-DB9B925BD872}" destId="{3E759B12-F7DF-4EF5-B418-F6FFEA1FB80F}" srcOrd="0" destOrd="0" presId="urn:microsoft.com/office/officeart/2005/8/layout/hProcess4"/>
+    <dgm:cxn modelId="{D6931C7E-302D-47EA-9528-1CA118E3A739}" type="presOf" srcId="{B4F202BB-15DF-4DAF-BF4F-71FD522BE12A}" destId="{16EBD39F-FBF6-41A9-8154-02526BCECBD6}" srcOrd="1" destOrd="0" presId="urn:microsoft.com/office/officeart/2005/8/layout/hProcess4"/>
+    <dgm:cxn modelId="{FEF5F300-7A8E-4EE1-972E-CC812EC011B0}" type="presOf" srcId="{ED5DADED-FCE7-41F0-9C45-5058318452B8}" destId="{171AAD30-C5AB-410D-B5A8-462655FF6DFF}" srcOrd="0" destOrd="0" presId="urn:microsoft.com/office/officeart/2005/8/layout/hProcess4"/>
     <dgm:cxn modelId="{F9B937A9-32F6-4351-9C8E-E61D6356E4DE}" type="presOf" srcId="{2E6ACB87-0757-43C9-9C57-AA060AD27EC7}" destId="{A807385D-E159-4AD1-B2F0-6D10566E3A0C}" srcOrd="1" destOrd="0" presId="urn:microsoft.com/office/officeart/2005/8/layout/hProcess4"/>
-    <dgm:cxn modelId="{3DF97DF8-BC7F-4834-97B4-D5FB8C1DF0CD}" srcId="{D18D074B-6165-4000-96EF-CC84856597B6}" destId="{BEB6383D-5F48-49AD-B003-39327DC52895}" srcOrd="0" destOrd="0" parTransId="{24826C1C-6465-4060-9196-6CF11CB54D75}" sibTransId="{C0A1D25B-B3D5-4E89-9EFC-C0CC61467844}"/>
-    <dgm:cxn modelId="{549903A1-85EA-4CBD-9D47-408EF52F44D5}" type="presOf" srcId="{D405BF79-7C82-407C-97C9-D37648AE0C80}" destId="{46B4D61D-D5FB-4FB1-A33B-4B3D30B8AEC0}" srcOrd="0" destOrd="0" presId="urn:microsoft.com/office/officeart/2005/8/layout/hProcess4"/>
-    <dgm:cxn modelId="{D6931C7E-302D-47EA-9528-1CA118E3A739}" type="presOf" srcId="{B4F202BB-15DF-4DAF-BF4F-71FD522BE12A}" destId="{16EBD39F-FBF6-41A9-8154-02526BCECBD6}" srcOrd="1" destOrd="0" presId="urn:microsoft.com/office/officeart/2005/8/layout/hProcess4"/>
-    <dgm:cxn modelId="{BAB62512-8276-4A88-B215-1F9C1E65D9A1}" type="presOf" srcId="{59771C6B-15BC-4FDA-8C1E-47717B3D8850}" destId="{534BA637-795B-4791-BEB5-E2BE6EDE78FC}" srcOrd="0" destOrd="1" presId="urn:microsoft.com/office/officeart/2005/8/layout/hProcess4"/>
     <dgm:cxn modelId="{CEFA2C7C-819F-424D-B19D-8C779D2FD82A}" srcId="{D9448254-AE8E-4635-ACBF-DB9B925BD872}" destId="{E721CA90-159E-4B4A-B347-490CB2DC1862}" srcOrd="0" destOrd="0" parTransId="{9EE03D91-B946-477F-9BB7-74599F47320B}" sibTransId="{ED5DADED-FCE7-41F0-9C45-5058318452B8}"/>
     <dgm:cxn modelId="{A592D6C5-2AF8-4423-A318-9F8B62A8E141}" srcId="{D9448254-AE8E-4635-ACBF-DB9B925BD872}" destId="{A9104333-25D5-4A30-8438-4885D4EE302A}" srcOrd="3" destOrd="0" parTransId="{4816358B-25CA-43EA-A838-AF7D4FB2EC6D}" sibTransId="{54E33CE2-7433-4100-98F3-D3E1AD1745A8}"/>
+    <dgm:cxn modelId="{C5C70189-3FF3-4F60-8DE1-B6E8113E6768}" srcId="{E721CA90-159E-4B4A-B347-490CB2DC1862}" destId="{D18D074B-6165-4000-96EF-CC84856597B6}" srcOrd="0" destOrd="0" parTransId="{46747984-3136-4FF1-942B-B28EA8413042}" sibTransId="{CCC01226-4C26-4DD8-9FB2-9E72FE4059A3}"/>
+    <dgm:cxn modelId="{DAA65F9F-5F68-433D-A11E-299BC5A3CF4A}" type="presOf" srcId="{F0999A7E-BAC8-4E85-9C92-F8616342925D}" destId="{61061CD2-5FA5-4B24-9A42-33BBE6630A46}" srcOrd="0" destOrd="0" presId="urn:microsoft.com/office/officeart/2005/8/layout/hProcess4"/>
+    <dgm:cxn modelId="{C71B9818-C8DD-42E1-97F6-2F792958AA09}" srcId="{A9104333-25D5-4A30-8438-4885D4EE302A}" destId="{B4F202BB-15DF-4DAF-BF4F-71FD522BE12A}" srcOrd="0" destOrd="0" parTransId="{B075E09D-7593-4E00-AAFE-D2381073EF29}" sibTransId="{80765F5B-A0E9-43BB-B238-67AEBBA66281}"/>
+    <dgm:cxn modelId="{D1CCAB09-E99F-41E1-A38D-162377E34A70}" type="presOf" srcId="{59DF42FF-C34D-4C87-87F3-214AE2998D04}" destId="{FA54A26A-9135-4542-A3F7-B0BAE1B9A780}" srcOrd="0" destOrd="0" presId="urn:microsoft.com/office/officeart/2005/8/layout/hProcess4"/>
+    <dgm:cxn modelId="{8B06B3BD-09E9-4E90-A362-18BD3B22904C}" type="presOf" srcId="{BEB6383D-5F48-49AD-B003-39327DC52895}" destId="{3608ADFF-D305-4AE1-A57C-BD6A4A179305}" srcOrd="0" destOrd="1" presId="urn:microsoft.com/office/officeart/2005/8/layout/hProcess4"/>
+    <dgm:cxn modelId="{00BAC469-EFB5-4A53-B249-6848487EDA2F}" type="presOf" srcId="{E721CA90-159E-4B4A-B347-490CB2DC1862}" destId="{D521EA5A-F59F-44EC-A133-47DD90FA89B7}" srcOrd="0" destOrd="0" presId="urn:microsoft.com/office/officeart/2005/8/layout/hProcess4"/>
+    <dgm:cxn modelId="{1B44AE96-8388-470B-A142-95D680A4E10A}" srcId="{D9448254-AE8E-4635-ACBF-DB9B925BD872}" destId="{D405BF79-7C82-407C-97C9-D37648AE0C80}" srcOrd="1" destOrd="0" parTransId="{FF1463BF-69BF-4B77-9D2A-7444892772C3}" sibTransId="{BBEC2269-E1E3-4B64-BA72-94489A579225}"/>
+    <dgm:cxn modelId="{9CD7A01E-050E-4186-B50A-657AE69C3A41}" srcId="{D18D074B-6165-4000-96EF-CC84856597B6}" destId="{A29A9B2B-3F7A-44C1-8093-582337A07BC9}" srcOrd="1" destOrd="0" parTransId="{FBA2E813-F0A1-44C8-8143-0E0C19ABAE7A}" sibTransId="{5E7520DC-4B36-4963-A8A1-9501E6F8990B}"/>
+    <dgm:cxn modelId="{01F8C81B-8064-400E-8FD5-06A24745071B}" type="presOf" srcId="{D18D074B-6165-4000-96EF-CC84856597B6}" destId="{1A69946C-9782-4DCB-9715-C9A8A667F0C8}" srcOrd="1" destOrd="0" presId="urn:microsoft.com/office/officeart/2005/8/layout/hProcess4"/>
+    <dgm:cxn modelId="{A2698DCE-7BCD-4FB7-9060-89C13C79B4D0}" type="presOf" srcId="{59771C6B-15BC-4FDA-8C1E-47717B3D8850}" destId="{16EBD39F-FBF6-41A9-8154-02526BCECBD6}" srcOrd="1" destOrd="1" presId="urn:microsoft.com/office/officeart/2005/8/layout/hProcess4"/>
+    <dgm:cxn modelId="{DBF1C19E-020D-4205-9606-ECA620F1C6CF}" type="presOf" srcId="{8011DAE7-E5E4-47CD-AD66-8B24BF36AF9D}" destId="{A807385D-E159-4AD1-B2F0-6D10566E3A0C}" srcOrd="1" destOrd="1" presId="urn:microsoft.com/office/officeart/2005/8/layout/hProcess4"/>
+    <dgm:cxn modelId="{38FBDF52-BFEC-4AA1-8D3F-1359CCC9ED62}" type="presOf" srcId="{7D411061-EEE6-4DCD-869C-9209B86CCEEB}" destId="{DA4C706D-A65C-46F4-B122-A54047B3C548}" srcOrd="1" destOrd="1" presId="urn:microsoft.com/office/officeart/2005/8/layout/hProcess4"/>
+    <dgm:cxn modelId="{549903A1-85EA-4CBD-9D47-408EF52F44D5}" type="presOf" srcId="{D405BF79-7C82-407C-97C9-D37648AE0C80}" destId="{46B4D61D-D5FB-4FB1-A33B-4B3D30B8AEC0}" srcOrd="0" destOrd="0" presId="urn:microsoft.com/office/officeart/2005/8/layout/hProcess4"/>
+    <dgm:cxn modelId="{B73DB81D-70AF-4270-9B6A-240AB9810C94}" type="presOf" srcId="{D18D074B-6165-4000-96EF-CC84856597B6}" destId="{3608ADFF-D305-4AE1-A57C-BD6A4A179305}" srcOrd="0" destOrd="0" presId="urn:microsoft.com/office/officeart/2005/8/layout/hProcess4"/>
+    <dgm:cxn modelId="{96A59A65-382C-45CB-A807-9F0F7CA64FDF}" srcId="{59DF42FF-C34D-4C87-87F3-214AE2998D04}" destId="{7D411061-EEE6-4DCD-869C-9209B86CCEEB}" srcOrd="1" destOrd="0" parTransId="{85C806DC-1C24-4A25-9241-32B338A6164F}" sibTransId="{D9418011-AFB8-49AA-98EA-41667369FC43}"/>
+    <dgm:cxn modelId="{9FAB019F-6D17-4419-BC7A-2FEC299A9391}" type="presOf" srcId="{7D411061-EEE6-4DCD-869C-9209B86CCEEB}" destId="{5D485618-4DD7-47D9-A0A9-4AEC986B5F6B}" srcOrd="0" destOrd="1" presId="urn:microsoft.com/office/officeart/2005/8/layout/hProcess4"/>
+    <dgm:cxn modelId="{D9E9E711-0110-4BA1-ABB8-22216166BDF3}" type="presOf" srcId="{A29A9B2B-3F7A-44C1-8093-582337A07BC9}" destId="{3608ADFF-D305-4AE1-A57C-BD6A4A179305}" srcOrd="0" destOrd="2" presId="urn:microsoft.com/office/officeart/2005/8/layout/hProcess4"/>
+    <dgm:cxn modelId="{7C6B9E94-7289-4107-8CEA-8FAB56397C26}" type="presOf" srcId="{2E6ACB87-0757-43C9-9C57-AA060AD27EC7}" destId="{7BFE43BA-8D4E-4911-B0C3-823734CD8334}" srcOrd="0" destOrd="0" presId="urn:microsoft.com/office/officeart/2005/8/layout/hProcess4"/>
+    <dgm:cxn modelId="{3DF97DF8-BC7F-4834-97B4-D5FB8C1DF0CD}" srcId="{D18D074B-6165-4000-96EF-CC84856597B6}" destId="{BEB6383D-5F48-49AD-B003-39327DC52895}" srcOrd="0" destOrd="0" parTransId="{24826C1C-6465-4060-9196-6CF11CB54D75}" sibTransId="{C0A1D25B-B3D5-4E89-9EFC-C0CC61467844}"/>
+    <dgm:cxn modelId="{618CE966-1FCB-408D-B41C-BEFFE7EC4AC7}" type="presOf" srcId="{8011DAE7-E5E4-47CD-AD66-8B24BF36AF9D}" destId="{7BFE43BA-8D4E-4911-B0C3-823734CD8334}" srcOrd="0" destOrd="1" presId="urn:microsoft.com/office/officeart/2005/8/layout/hProcess4"/>
     <dgm:cxn modelId="{B1EE3F36-A1D9-44EE-B34B-B6F41748A2DA}" srcId="{D405BF79-7C82-407C-97C9-D37648AE0C80}" destId="{2E6ACB87-0757-43C9-9C57-AA060AD27EC7}" srcOrd="0" destOrd="0" parTransId="{6196041A-2A52-4845-B3AB-819AF68A76EE}" sibTransId="{BFBD9B4A-A81E-471C-A154-E48AD9E133E0}"/>
-    <dgm:cxn modelId="{01F8C81B-8064-400E-8FD5-06A24745071B}" type="presOf" srcId="{D18D074B-6165-4000-96EF-CC84856597B6}" destId="{1A69946C-9782-4DCB-9715-C9A8A667F0C8}" srcOrd="1" destOrd="0" presId="urn:microsoft.com/office/officeart/2005/8/layout/hProcess4"/>
-    <dgm:cxn modelId="{9CD7A01E-050E-4186-B50A-657AE69C3A41}" srcId="{D18D074B-6165-4000-96EF-CC84856597B6}" destId="{A29A9B2B-3F7A-44C1-8093-582337A07BC9}" srcOrd="1" destOrd="0" parTransId="{FBA2E813-F0A1-44C8-8143-0E0C19ABAE7A}" sibTransId="{5E7520DC-4B36-4963-A8A1-9501E6F8990B}"/>
+    <dgm:cxn modelId="{55714F80-1D47-455D-90E3-0F19CDEEB48C}" srcId="{A9104333-25D5-4A30-8438-4885D4EE302A}" destId="{59771C6B-15BC-4FDA-8C1E-47717B3D8850}" srcOrd="1" destOrd="0" parTransId="{A4CE76F5-B6A1-4365-8991-75054459C8D1}" sibTransId="{DACC9DED-6447-489B-B681-604ACB142661}"/>
+    <dgm:cxn modelId="{4707D2C5-D9CD-4D5C-AC39-1364218E98A3}" type="presOf" srcId="{F36801D7-49D8-49A5-AD5D-B220567AA634}" destId="{5D485618-4DD7-47D9-A0A9-4AEC986B5F6B}" srcOrd="0" destOrd="0" presId="urn:microsoft.com/office/officeart/2005/8/layout/hProcess4"/>
+    <dgm:cxn modelId="{E82BA64F-4DA1-4C14-80E7-466DAB9D0F16}" srcId="{59DF42FF-C34D-4C87-87F3-214AE2998D04}" destId="{F36801D7-49D8-49A5-AD5D-B220567AA634}" srcOrd="0" destOrd="0" parTransId="{674E1BA2-291C-461B-B48E-E989FA229107}" sibTransId="{B57876D5-5A58-4E42-824C-480133EF53C2}"/>
+    <dgm:cxn modelId="{1914AE6C-974B-43A9-9B9E-B3F91224977A}" type="presOf" srcId="{A29A9B2B-3F7A-44C1-8093-582337A07BC9}" destId="{1A69946C-9782-4DCB-9715-C9A8A667F0C8}" srcOrd="1" destOrd="2" presId="urn:microsoft.com/office/officeart/2005/8/layout/hProcess4"/>
+    <dgm:cxn modelId="{E23F9FD8-8DE1-49C4-9091-F46D36EE2C75}" type="presOf" srcId="{A9104333-25D5-4A30-8438-4885D4EE302A}" destId="{19F24AEE-DAFE-440C-A732-9E1AA2CABE12}" srcOrd="0" destOrd="0" presId="urn:microsoft.com/office/officeart/2005/8/layout/hProcess4"/>
+    <dgm:cxn modelId="{4CC355DE-2BF8-4DBD-9FFF-6FD763B9C7EF}" type="presOf" srcId="{D9448254-AE8E-4635-ACBF-DB9B925BD872}" destId="{3E759B12-F7DF-4EF5-B418-F6FFEA1FB80F}" srcOrd="0" destOrd="0" presId="urn:microsoft.com/office/officeart/2005/8/layout/hProcess4"/>
     <dgm:cxn modelId="{61AD4473-CC5E-4148-9524-EE56AE4E6E0A}" srcId="{D405BF79-7C82-407C-97C9-D37648AE0C80}" destId="{8011DAE7-E5E4-47CD-AD66-8B24BF36AF9D}" srcOrd="1" destOrd="0" parTransId="{E9848E13-DDF3-4E12-A7A1-6A71F5129E87}" sibTransId="{1A594544-5E10-42C7-8D1F-B1C58D60E355}"/>
-    <dgm:cxn modelId="{C71B9818-C8DD-42E1-97F6-2F792958AA09}" srcId="{A9104333-25D5-4A30-8438-4885D4EE302A}" destId="{B4F202BB-15DF-4DAF-BF4F-71FD522BE12A}" srcOrd="0" destOrd="0" parTransId="{B075E09D-7593-4E00-AAFE-D2381073EF29}" sibTransId="{80765F5B-A0E9-43BB-B238-67AEBBA66281}"/>
-    <dgm:cxn modelId="{1B44AE96-8388-470B-A142-95D680A4E10A}" srcId="{D9448254-AE8E-4635-ACBF-DB9B925BD872}" destId="{D405BF79-7C82-407C-97C9-D37648AE0C80}" srcOrd="1" destOrd="0" parTransId="{FF1463BF-69BF-4B77-9D2A-7444892772C3}" sibTransId="{BBEC2269-E1E3-4B64-BA72-94489A579225}"/>
-    <dgm:cxn modelId="{4707D2C5-D9CD-4D5C-AC39-1364218E98A3}" type="presOf" srcId="{F36801D7-49D8-49A5-AD5D-B220567AA634}" destId="{5D485618-4DD7-47D9-A0A9-4AEC986B5F6B}" srcOrd="0" destOrd="0" presId="urn:microsoft.com/office/officeart/2005/8/layout/hProcess4"/>
-    <dgm:cxn modelId="{FEF5F300-7A8E-4EE1-972E-CC812EC011B0}" type="presOf" srcId="{ED5DADED-FCE7-41F0-9C45-5058318452B8}" destId="{171AAD30-C5AB-410D-B5A8-462655FF6DFF}" srcOrd="0" destOrd="0" presId="urn:microsoft.com/office/officeart/2005/8/layout/hProcess4"/>
-    <dgm:cxn modelId="{A2698DCE-7BCD-4FB7-9060-89C13C79B4D0}" type="presOf" srcId="{59771C6B-15BC-4FDA-8C1E-47717B3D8850}" destId="{16EBD39F-FBF6-41A9-8154-02526BCECBD6}" srcOrd="1" destOrd="1" presId="urn:microsoft.com/office/officeart/2005/8/layout/hProcess4"/>
-    <dgm:cxn modelId="{E23F9FD8-8DE1-49C4-9091-F46D36EE2C75}" type="presOf" srcId="{A9104333-25D5-4A30-8438-4885D4EE302A}" destId="{19F24AEE-DAFE-440C-A732-9E1AA2CABE12}" srcOrd="0" destOrd="0" presId="urn:microsoft.com/office/officeart/2005/8/layout/hProcess4"/>
-    <dgm:cxn modelId="{3E1A3788-63C1-47F8-94E0-878495A8D31B}" srcId="{D9448254-AE8E-4635-ACBF-DB9B925BD872}" destId="{59DF42FF-C34D-4C87-87F3-214AE2998D04}" srcOrd="2" destOrd="0" parTransId="{B368E38A-939D-4EDC-8B11-4E8C490045AE}" sibTransId="{F0999A7E-BAC8-4E85-9C92-F8616342925D}"/>
     <dgm:cxn modelId="{CF6AFDC9-3338-4F36-8212-8D19AB54B90B}" type="presParOf" srcId="{3E759B12-F7DF-4EF5-B418-F6FFEA1FB80F}" destId="{6D8694A4-D71E-44F2-BD6A-B7C8E2C7DFA8}" srcOrd="0" destOrd="0" presId="urn:microsoft.com/office/officeart/2005/8/layout/hProcess4"/>
     <dgm:cxn modelId="{D32B6C90-C352-44E8-992A-AF37A53404E6}" type="presParOf" srcId="{3E759B12-F7DF-4EF5-B418-F6FFEA1FB80F}" destId="{1C449EC0-106D-464F-B696-08ED9305EA64}" srcOrd="1" destOrd="0" presId="urn:microsoft.com/office/officeart/2005/8/layout/hProcess4"/>
     <dgm:cxn modelId="{C83039FB-1622-4EE4-AC98-EB096BD69838}" type="presParOf" srcId="{3E759B12-F7DF-4EF5-B418-F6FFEA1FB80F}" destId="{0CD1F921-D2C5-44CF-8E3D-BA66188E6B46}" srcOrd="2" destOrd="0" presId="urn:microsoft.com/office/officeart/2005/8/layout/hProcess4"/>
@@ -4697,7 +4767,7 @@
           <a:p>
             <a:fld id="{23EA5F57-F648-43F1-BBC1-DE9979CBC4B2}" type="datetimeFigureOut">
               <a:rPr lang="en-US" smtClean="0"/>
-              <a:t>10/2/2010</a:t>
+              <a:t>10/3/2010</a:t>
             </a:fld>
             <a:endParaRPr lang="en-US"/>
           </a:p>
@@ -4867,7 +4937,7 @@
           <a:p>
             <a:fld id="{23EA5F57-F648-43F1-BBC1-DE9979CBC4B2}" type="datetimeFigureOut">
               <a:rPr lang="en-US" smtClean="0"/>
-              <a:t>10/2/2010</a:t>
+              <a:t>10/3/2010</a:t>
             </a:fld>
             <a:endParaRPr lang="en-US"/>
           </a:p>
@@ -5047,7 +5117,7 @@
           <a:p>
             <a:fld id="{23EA5F57-F648-43F1-BBC1-DE9979CBC4B2}" type="datetimeFigureOut">
               <a:rPr lang="en-US" smtClean="0"/>
-              <a:t>10/2/2010</a:t>
+              <a:t>10/3/2010</a:t>
             </a:fld>
             <a:endParaRPr lang="en-US"/>
           </a:p>
@@ -5217,7 +5287,7 @@
           <a:p>
             <a:fld id="{23EA5F57-F648-43F1-BBC1-DE9979CBC4B2}" type="datetimeFigureOut">
               <a:rPr lang="en-US" smtClean="0"/>
-              <a:t>10/2/2010</a:t>
+              <a:t>10/3/2010</a:t>
             </a:fld>
             <a:endParaRPr lang="en-US"/>
           </a:p>
@@ -5463,7 +5533,7 @@
           <a:p>
             <a:fld id="{23EA5F57-F648-43F1-BBC1-DE9979CBC4B2}" type="datetimeFigureOut">
               <a:rPr lang="en-US" smtClean="0"/>
-              <a:t>10/2/2010</a:t>
+              <a:t>10/3/2010</a:t>
             </a:fld>
             <a:endParaRPr lang="en-US"/>
           </a:p>
@@ -5751,7 +5821,7 @@
           <a:p>
             <a:fld id="{23EA5F57-F648-43F1-BBC1-DE9979CBC4B2}" type="datetimeFigureOut">
               <a:rPr lang="en-US" smtClean="0"/>
-              <a:t>10/2/2010</a:t>
+              <a:t>10/3/2010</a:t>
             </a:fld>
             <a:endParaRPr lang="en-US"/>
           </a:p>
@@ -6178,7 +6248,7 @@
           <a:p>
             <a:fld id="{23EA5F57-F648-43F1-BBC1-DE9979CBC4B2}" type="datetimeFigureOut">
               <a:rPr lang="en-US" smtClean="0"/>
-              <a:t>10/2/2010</a:t>
+              <a:t>10/3/2010</a:t>
             </a:fld>
             <a:endParaRPr lang="en-US"/>
           </a:p>
@@ -6296,7 +6366,7 @@
           <a:p>
             <a:fld id="{23EA5F57-F648-43F1-BBC1-DE9979CBC4B2}" type="datetimeFigureOut">
               <a:rPr lang="en-US" smtClean="0"/>
-              <a:t>10/2/2010</a:t>
+              <a:t>10/3/2010</a:t>
             </a:fld>
             <a:endParaRPr lang="en-US"/>
           </a:p>
@@ -6391,7 +6461,7 @@
           <a:p>
             <a:fld id="{23EA5F57-F648-43F1-BBC1-DE9979CBC4B2}" type="datetimeFigureOut">
               <a:rPr lang="en-US" smtClean="0"/>
-              <a:t>10/2/2010</a:t>
+              <a:t>10/3/2010</a:t>
             </a:fld>
             <a:endParaRPr lang="en-US"/>
           </a:p>
@@ -6668,7 +6738,7 @@
           <a:p>
             <a:fld id="{23EA5F57-F648-43F1-BBC1-DE9979CBC4B2}" type="datetimeFigureOut">
               <a:rPr lang="en-US" smtClean="0"/>
-              <a:t>10/2/2010</a:t>
+              <a:t>10/3/2010</a:t>
             </a:fld>
             <a:endParaRPr lang="en-US"/>
           </a:p>
@@ -6921,7 +6991,7 @@
           <a:p>
             <a:fld id="{23EA5F57-F648-43F1-BBC1-DE9979CBC4B2}" type="datetimeFigureOut">
               <a:rPr lang="en-US" smtClean="0"/>
-              <a:t>10/2/2010</a:t>
+              <a:t>10/3/2010</a:t>
             </a:fld>
             <a:endParaRPr lang="en-US"/>
           </a:p>
@@ -7134,7 +7204,7 @@
           <a:p>
             <a:fld id="{23EA5F57-F648-43F1-BBC1-DE9979CBC4B2}" type="datetimeFigureOut">
               <a:rPr lang="en-US" smtClean="0"/>
-              <a:t>10/2/2010</a:t>
+              <a:t>10/3/2010</a:t>
             </a:fld>
             <a:endParaRPr lang="en-US"/>
           </a:p>
@@ -7611,6 +7681,87 @@
           </a:p>
         </p:txBody>
       </p:sp>
+      <p:sp>
+        <p:nvSpPr>
+          <p:cNvPr id="8" name="TextBox 7"/>
+          <p:cNvSpPr txBox="1"/>
+          <p:nvPr/>
+        </p:nvSpPr>
+        <p:spPr>
+          <a:xfrm>
+            <a:off x="5181600" y="2405390"/>
+            <a:ext cx="627095" cy="261610"/>
+          </a:xfrm>
+          <a:prstGeom prst="rect">
+            <a:avLst/>
+          </a:prstGeom>
+        </p:spPr>
+        <p:style>
+          <a:lnRef idx="1">
+            <a:schemeClr val="accent6"/>
+          </a:lnRef>
+          <a:fillRef idx="2">
+            <a:schemeClr val="accent6"/>
+          </a:fillRef>
+          <a:effectRef idx="1">
+            <a:schemeClr val="accent6"/>
+          </a:effectRef>
+          <a:fontRef idx="minor">
+            <a:schemeClr val="dk1"/>
+          </a:fontRef>
+        </p:style>
+        <p:txBody>
+          <a:bodyPr wrap="none" rtlCol="0">
+            <a:spAutoFit/>
+          </a:bodyPr>
+          <a:lstStyle/>
+          <a:p>
+            <a:r>
+              <a:rPr lang="en-US" sz="1100" b="1" dirty="0" smtClean="0"/>
+              <a:t>Indexer</a:t>
+            </a:r>
+            <a:endParaRPr lang="en-US" sz="1100" b="1" dirty="0"/>
+          </a:p>
+        </p:txBody>
+      </p:sp>
+      <p:sp>
+        <p:nvSpPr>
+          <p:cNvPr id="9" name="Down Arrow 8"/>
+          <p:cNvSpPr/>
+          <p:nvPr/>
+        </p:nvSpPr>
+        <p:spPr>
+          <a:xfrm>
+            <a:off x="5466544" y="2133600"/>
+            <a:ext cx="198120" cy="228600"/>
+          </a:xfrm>
+          <a:prstGeom prst="downArrow">
+            <a:avLst/>
+          </a:prstGeom>
+        </p:spPr>
+        <p:style>
+          <a:lnRef idx="1">
+            <a:schemeClr val="accent6"/>
+          </a:lnRef>
+          <a:fillRef idx="2">
+            <a:schemeClr val="accent6"/>
+          </a:fillRef>
+          <a:effectRef idx="1">
+            <a:schemeClr val="accent6"/>
+          </a:effectRef>
+          <a:fontRef idx="minor">
+            <a:schemeClr val="dk1"/>
+          </a:fontRef>
+        </p:style>
+        <p:txBody>
+          <a:bodyPr rtlCol="0" anchor="ctr"/>
+          <a:lstStyle/>
+          <a:p>
+            <a:pPr algn="ctr"/>
+            <a:endParaRPr lang="en-US"/>
+          </a:p>
+        </p:txBody>
+      </p:sp>
     </p:spTree>
     <p:extLst>
       <p:ext uri="{BB962C8B-B14F-4D97-AF65-F5344CB8AC3E}">

</xml_diff>